<commit_message>
2020-05-20; update Logo_Carpenters Cabin/Carpenters Cabin.pptx
</commit_message>
<xml_diff>
--- a/Logo_Carpenters Cabin/Carpenters Cabin.pptx
+++ b/Logo_Carpenters Cabin/Carpenters Cabin.pptx
@@ -5,8 +5,9 @@
     <p:sldMasterId id="2147483648" r:id="rId1"/>
   </p:sldMasterIdLst>
   <p:sldIdLst>
-    <p:sldId id="257" r:id="rId2"/>
-    <p:sldId id="256" r:id="rId3"/>
+    <p:sldId id="258" r:id="rId2"/>
+    <p:sldId id="257" r:id="rId3"/>
+    <p:sldId id="256" r:id="rId4"/>
   </p:sldIdLst>
   <p:sldSz cx="12192000" cy="6858000"/>
   <p:notesSz cx="6875463" cy="10002838"/>
@@ -105,6 +106,11 @@
       </a:defRPr>
     </a:lvl9pPr>
   </p:defaultTextStyle>
+  <p:extLst>
+    <p:ext uri="{EFAFB233-063F-42B5-8137-9DF3F51BA10A}">
+      <p15:sldGuideLst xmlns:p15="http://schemas.microsoft.com/office/powerpoint/2012/main"/>
+    </p:ext>
+  </p:extLst>
 </p:presentation>
 </file>
 
@@ -239,7 +245,7 @@
           <a:p>
             <a:fld id="{FA4F5C1B-C6CB-4E3C-A8C5-26A1B8B976E3}" type="datetimeFigureOut">
               <a:rPr lang="ko-KR" altLang="en-US" smtClean="0"/>
-              <a:t>2020-05-19</a:t>
+              <a:t>2020-05-20</a:t>
             </a:fld>
             <a:endParaRPr lang="ko-KR" altLang="en-US"/>
           </a:p>
@@ -409,7 +415,7 @@
           <a:p>
             <a:fld id="{FA4F5C1B-C6CB-4E3C-A8C5-26A1B8B976E3}" type="datetimeFigureOut">
               <a:rPr lang="ko-KR" altLang="en-US" smtClean="0"/>
-              <a:t>2020-05-19</a:t>
+              <a:t>2020-05-20</a:t>
             </a:fld>
             <a:endParaRPr lang="ko-KR" altLang="en-US"/>
           </a:p>
@@ -589,7 +595,7 @@
           <a:p>
             <a:fld id="{FA4F5C1B-C6CB-4E3C-A8C5-26A1B8B976E3}" type="datetimeFigureOut">
               <a:rPr lang="ko-KR" altLang="en-US" smtClean="0"/>
-              <a:t>2020-05-19</a:t>
+              <a:t>2020-05-20</a:t>
             </a:fld>
             <a:endParaRPr lang="ko-KR" altLang="en-US"/>
           </a:p>
@@ -759,7 +765,7 @@
           <a:p>
             <a:fld id="{FA4F5C1B-C6CB-4E3C-A8C5-26A1B8B976E3}" type="datetimeFigureOut">
               <a:rPr lang="ko-KR" altLang="en-US" smtClean="0"/>
-              <a:t>2020-05-19</a:t>
+              <a:t>2020-05-20</a:t>
             </a:fld>
             <a:endParaRPr lang="ko-KR" altLang="en-US"/>
           </a:p>
@@ -1005,7 +1011,7 @@
           <a:p>
             <a:fld id="{FA4F5C1B-C6CB-4E3C-A8C5-26A1B8B976E3}" type="datetimeFigureOut">
               <a:rPr lang="ko-KR" altLang="en-US" smtClean="0"/>
-              <a:t>2020-05-19</a:t>
+              <a:t>2020-05-20</a:t>
             </a:fld>
             <a:endParaRPr lang="ko-KR" altLang="en-US"/>
           </a:p>
@@ -1237,7 +1243,7 @@
           <a:p>
             <a:fld id="{FA4F5C1B-C6CB-4E3C-A8C5-26A1B8B976E3}" type="datetimeFigureOut">
               <a:rPr lang="ko-KR" altLang="en-US" smtClean="0"/>
-              <a:t>2020-05-19</a:t>
+              <a:t>2020-05-20</a:t>
             </a:fld>
             <a:endParaRPr lang="ko-KR" altLang="en-US"/>
           </a:p>
@@ -1604,7 +1610,7 @@
           <a:p>
             <a:fld id="{FA4F5C1B-C6CB-4E3C-A8C5-26A1B8B976E3}" type="datetimeFigureOut">
               <a:rPr lang="ko-KR" altLang="en-US" smtClean="0"/>
-              <a:t>2020-05-19</a:t>
+              <a:t>2020-05-20</a:t>
             </a:fld>
             <a:endParaRPr lang="ko-KR" altLang="en-US"/>
           </a:p>
@@ -1722,7 +1728,7 @@
           <a:p>
             <a:fld id="{FA4F5C1B-C6CB-4E3C-A8C5-26A1B8B976E3}" type="datetimeFigureOut">
               <a:rPr lang="ko-KR" altLang="en-US" smtClean="0"/>
-              <a:t>2020-05-19</a:t>
+              <a:t>2020-05-20</a:t>
             </a:fld>
             <a:endParaRPr lang="ko-KR" altLang="en-US"/>
           </a:p>
@@ -1817,7 +1823,7 @@
           <a:p>
             <a:fld id="{FA4F5C1B-C6CB-4E3C-A8C5-26A1B8B976E3}" type="datetimeFigureOut">
               <a:rPr lang="ko-KR" altLang="en-US" smtClean="0"/>
-              <a:t>2020-05-19</a:t>
+              <a:t>2020-05-20</a:t>
             </a:fld>
             <a:endParaRPr lang="ko-KR" altLang="en-US"/>
           </a:p>
@@ -2094,7 +2100,7 @@
           <a:p>
             <a:fld id="{FA4F5C1B-C6CB-4E3C-A8C5-26A1B8B976E3}" type="datetimeFigureOut">
               <a:rPr lang="ko-KR" altLang="en-US" smtClean="0"/>
-              <a:t>2020-05-19</a:t>
+              <a:t>2020-05-20</a:t>
             </a:fld>
             <a:endParaRPr lang="ko-KR" altLang="en-US"/>
           </a:p>
@@ -2347,7 +2353,7 @@
           <a:p>
             <a:fld id="{FA4F5C1B-C6CB-4E3C-A8C5-26A1B8B976E3}" type="datetimeFigureOut">
               <a:rPr lang="ko-KR" altLang="en-US" smtClean="0"/>
-              <a:t>2020-05-19</a:t>
+              <a:t>2020-05-20</a:t>
             </a:fld>
             <a:endParaRPr lang="ko-KR" altLang="en-US"/>
           </a:p>
@@ -2560,7 +2566,7 @@
           <a:p>
             <a:fld id="{FA4F5C1B-C6CB-4E3C-A8C5-26A1B8B976E3}" type="datetimeFigureOut">
               <a:rPr lang="ko-KR" altLang="en-US" smtClean="0"/>
-              <a:t>2020-05-19</a:t>
+              <a:t>2020-05-20</a:t>
             </a:fld>
             <a:endParaRPr lang="ko-KR" altLang="en-US"/>
           </a:p>
@@ -2965,6 +2971,91 @@
           <a:chExt cx="0" cy="0"/>
         </a:xfrm>
       </p:grpSpPr>
+      <p:pic>
+        <p:nvPicPr>
+          <p:cNvPr id="15" name="그림 14"/>
+          <p:cNvPicPr>
+            <a:picLocks noChangeAspect="1"/>
+          </p:cNvPicPr>
+          <p:nvPr/>
+        </p:nvPicPr>
+        <p:blipFill>
+          <a:blip r:embed="rId2"/>
+          <a:stretch>
+            <a:fillRect/>
+          </a:stretch>
+        </p:blipFill>
+        <p:spPr>
+          <a:xfrm flipH="1">
+            <a:off x="1845854" y="2948926"/>
+            <a:ext cx="8016935" cy="2523963"/>
+          </a:xfrm>
+          <a:prstGeom prst="rect">
+            <a:avLst/>
+          </a:prstGeom>
+        </p:spPr>
+      </p:pic>
+      <p:pic>
+        <p:nvPicPr>
+          <p:cNvPr id="16" name="그림 15"/>
+          <p:cNvPicPr>
+            <a:picLocks noChangeAspect="1"/>
+          </p:cNvPicPr>
+          <p:nvPr/>
+        </p:nvPicPr>
+        <p:blipFill>
+          <a:blip r:embed="rId3"/>
+          <a:stretch>
+            <a:fillRect/>
+          </a:stretch>
+        </p:blipFill>
+        <p:spPr>
+          <a:xfrm flipH="1">
+            <a:off x="1845853" y="724396"/>
+            <a:ext cx="8016935" cy="2523963"/>
+          </a:xfrm>
+          <a:prstGeom prst="rect">
+            <a:avLst/>
+          </a:prstGeom>
+        </p:spPr>
+      </p:pic>
+    </p:spTree>
+    <p:extLst>
+      <p:ext uri="{BB962C8B-B14F-4D97-AF65-F5344CB8AC3E}">
+        <p14:creationId xmlns:p14="http://schemas.microsoft.com/office/powerpoint/2010/main" val="816032042"/>
+      </p:ext>
+    </p:extLst>
+  </p:cSld>
+  <p:clrMapOvr>
+    <a:masterClrMapping/>
+  </p:clrMapOvr>
+  <p:timing>
+    <p:tnLst>
+      <p:par>
+        <p:cTn id="1" dur="indefinite" restart="never" nodeType="tmRoot"/>
+      </p:par>
+    </p:tnLst>
+  </p:timing>
+</p:sld>
+</file>
+
+<file path=ppt/slides/slide2.xml><?xml version="1.0" encoding="utf-8"?>
+<p:sld xmlns:a="http://schemas.openxmlformats.org/drawingml/2006/main" xmlns:r="http://schemas.openxmlformats.org/officeDocument/2006/relationships" xmlns:p="http://schemas.openxmlformats.org/presentationml/2006/main">
+  <p:cSld>
+    <p:spTree>
+      <p:nvGrpSpPr>
+        <p:cNvPr id="1" name=""/>
+        <p:cNvGrpSpPr/>
+        <p:nvPr/>
+      </p:nvGrpSpPr>
+      <p:grpSpPr>
+        <a:xfrm>
+          <a:off x="0" y="0"/>
+          <a:ext cx="0" cy="0"/>
+          <a:chOff x="0" y="0"/>
+          <a:chExt cx="0" cy="0"/>
+        </a:xfrm>
+      </p:grpSpPr>
       <p:grpSp>
         <p:nvGrpSpPr>
           <p:cNvPr id="13" name="그룹 12"/>
@@ -3081,8 +3172,8 @@
               </p:nvSpPr>
               <p:spPr>
                 <a:xfrm>
-                  <a:off x="4053385" y="1753659"/>
-                  <a:ext cx="5277134" cy="369332"/>
+                  <a:off x="6550680" y="2085663"/>
+                  <a:ext cx="2778201" cy="369332"/>
                 </a:xfrm>
                 <a:prstGeom prst="rect">
                   <a:avLst/>
@@ -3119,7 +3210,7 @@
             </p:nvSpPr>
             <p:spPr>
               <a:xfrm>
-                <a:off x="7137779" y="2315351"/>
+                <a:off x="6796520" y="2344984"/>
                 <a:ext cx="2192740" cy="400110"/>
               </a:xfrm>
               <a:prstGeom prst="rect">
@@ -3196,7 +3287,7 @@
       </p:grpSp>
       <p:pic>
         <p:nvPicPr>
-          <p:cNvPr id="2" name="그림 1"/>
+          <p:cNvPr id="3" name="그림 2"/>
           <p:cNvPicPr>
             <a:picLocks noChangeAspect="1"/>
           </p:cNvPicPr>
@@ -3210,8 +3301,8 @@
         </p:blipFill>
         <p:spPr>
           <a:xfrm flipH="1">
-            <a:off x="2055062" y="2940685"/>
-            <a:ext cx="7977335" cy="2254563"/>
+            <a:off x="1845854" y="2948926"/>
+            <a:ext cx="8016935" cy="2523963"/>
           </a:xfrm>
           <a:prstGeom prst="rect">
             <a:avLst/>
@@ -3238,7 +3329,7 @@
 </p:sld>
 </file>
 
-<file path=ppt/slides/slide2.xml><?xml version="1.0" encoding="utf-8"?>
+<file path=ppt/slides/slide3.xml><?xml version="1.0" encoding="utf-8"?>
 <p:sld xmlns:a="http://schemas.openxmlformats.org/drawingml/2006/main" xmlns:r="http://schemas.openxmlformats.org/officeDocument/2006/relationships" xmlns:p="http://schemas.openxmlformats.org/presentationml/2006/main">
   <p:cSld>
     <p:spTree>
@@ -3263,7 +3354,7 @@
         </p:nvSpPr>
         <p:spPr>
           <a:xfrm>
-            <a:off x="8276834" y="4993622"/>
+            <a:off x="8348757" y="5667138"/>
             <a:ext cx="3119047" cy="923330"/>
           </a:xfrm>
           <a:prstGeom prst="rect">
@@ -3457,8 +3548,8 @@
               </p:nvSpPr>
               <p:spPr>
                 <a:xfrm>
-                  <a:off x="4053385" y="1753659"/>
-                  <a:ext cx="5277134" cy="369332"/>
+                  <a:off x="6533178" y="2046792"/>
+                  <a:ext cx="2797341" cy="400110"/>
                 </a:xfrm>
                 <a:prstGeom prst="rect">
                   <a:avLst/>
@@ -3473,13 +3564,13 @@
                 <a:p>
                   <a:pPr algn="ctr"/>
                   <a:r>
-                    <a:rPr lang="en-US" altLang="ko-KR" dirty="0" smtClean="0">
+                    <a:rPr lang="en-US" altLang="ko-KR" sz="2000" dirty="0" smtClean="0">
                       <a:latin typeface="Stencil BT" pitchFamily="2" charset="0"/>
                       <a:ea typeface="D2Coding" panose="020B0609020101020101" pitchFamily="49" charset="-127"/>
                     </a:rPr>
-                    <a:t>CN0001 2020.05.16</a:t>
+                    <a:t>Since 2016.12.10</a:t>
                   </a:r>
-                  <a:endParaRPr lang="ko-KR" altLang="en-US" dirty="0">
+                  <a:endParaRPr lang="ko-KR" altLang="en-US" sz="2000" dirty="0">
                     <a:latin typeface="Stencil BT" pitchFamily="2" charset="0"/>
                     <a:ea typeface="D2Coding" panose="020B0609020101020101" pitchFamily="49" charset="-127"/>
                   </a:endParaRPr>
@@ -3495,7 +3586,7 @@
             </p:nvSpPr>
             <p:spPr>
               <a:xfrm>
-                <a:off x="7137779" y="2315351"/>
+                <a:off x="6829126" y="2341677"/>
                 <a:ext cx="2192740" cy="400110"/>
               </a:xfrm>
               <a:prstGeom prst="rect">
@@ -3514,7 +3605,7 @@
                   <a:rPr lang="en-US" altLang="ko-KR" sz="2000" dirty="0" smtClean="0">
                     <a:latin typeface="Stencil BT" pitchFamily="2" charset="0"/>
                   </a:rPr>
-                  <a:t>For Mr. Kwak</a:t>
+                  <a:t>By Yoonki KIM</a:t>
                 </a:r>
                 <a:endParaRPr lang="ko-KR" altLang="en-US" sz="2000" dirty="0">
                   <a:latin typeface="Stencil BT" pitchFamily="2" charset="0"/>
@@ -3604,6 +3695,30 @@
           </a:p>
         </p:txBody>
       </p:sp>
+      <p:pic>
+        <p:nvPicPr>
+          <p:cNvPr id="3" name="그림 2"/>
+          <p:cNvPicPr>
+            <a:picLocks noChangeAspect="1"/>
+          </p:cNvPicPr>
+          <p:nvPr/>
+        </p:nvPicPr>
+        <p:blipFill>
+          <a:blip r:embed="rId3"/>
+          <a:stretch>
+            <a:fillRect/>
+          </a:stretch>
+        </p:blipFill>
+        <p:spPr>
+          <a:xfrm flipH="1">
+            <a:off x="1845854" y="3043210"/>
+            <a:ext cx="8016935" cy="2523963"/>
+          </a:xfrm>
+          <a:prstGeom prst="rect">
+            <a:avLst/>
+          </a:prstGeom>
+        </p:spPr>
+      </p:pic>
     </p:spTree>
     <p:extLst>
       <p:ext uri="{BB962C8B-B14F-4D97-AF65-F5344CB8AC3E}">

</xml_diff>